<commit_message>
Update Logistic Regression presentation with new content and improvements
</commit_message>
<xml_diff>
--- a/3-Machine_Learning/1-Supervisado/2-Classification/4-Logistic_Regression/Logistic_Regression.pptx
+++ b/3-Machine_Learning/1-Supervisado/2-Classification/4-Logistic_Regression/Logistic_Regression.pptx
@@ -348,7 +348,7 @@
               <a:rPr lang="es-ES" sz="1400" b="0" strike="noStrike" spc="-1">
                 <a:latin typeface="Times New Roman"/>
               </a:rPr>
-              <a:t>‹Nº›</a:t>
+              <a:t>‹#›</a:t>
             </a:fld>
             <a:endParaRPr lang="es-ES" sz="1400" b="0" strike="noStrike" spc="-1">
               <a:latin typeface="Times New Roman"/>
@@ -7766,7 +7766,7 @@
         <p:spPr>
           <a:xfrm>
             <a:off x="914399" y="1571348"/>
-            <a:ext cx="10093912" cy="3046988"/>
+            <a:ext cx="10093912" cy="2800767"/>
           </a:xfrm>
           <a:prstGeom prst="rect">
             <a:avLst/>
@@ -7793,7 +7793,7 @@
                   <a:schemeClr val="bg1"/>
                 </a:solidFill>
               </a:rPr>
-              <a:t>OvR</a:t>
+              <a:t>OvA</a:t>
             </a:r>
             <a:r>
               <a:rPr lang="es-ES" sz="1600" dirty="0">
@@ -7900,22 +7900,6 @@
             </a:r>
           </a:p>
           <a:p>
-            <a:pPr marL="342900" indent="-342900">
-              <a:buFont typeface="+mj-lt"/>
-              <a:buAutoNum type="arabicPeriod"/>
-            </a:pPr>
-            <a:endParaRPr lang="es-ES" sz="1600" dirty="0">
-              <a:solidFill>
-                <a:schemeClr val="bg1"/>
-              </a:solidFill>
-              <a:sym typeface="Wingdings" panose="05000000000000000000" pitchFamily="2" charset="2"/>
-            </a:endParaRPr>
-          </a:p>
-          <a:p>
-            <a:pPr marL="342900" indent="-342900">
-              <a:buFont typeface="+mj-lt"/>
-              <a:buAutoNum type="arabicPeriod"/>
-            </a:pPr>
             <a:endParaRPr lang="es-ES" sz="1600" dirty="0">
               <a:solidFill>
                 <a:schemeClr val="bg1"/>

</xml_diff>